<commit_message>
Branch for adding Batterywise analysis!
</commit_message>
<xml_diff>
--- a/Automationdashboard/MAIN_FOLDER/Automation_Dashboard_Batterywise/V2/D11_03_2024/B4_BT02_09.56_10.40/analysis_B4_BT02_09.56_10.40.pptx
+++ b/Automationdashboard/MAIN_FOLDER/Automation_Dashboard_Batterywise/V2/D11_03_2024/B4_BT02_09.56_10.40/analysis_B4_BT02_09.56_10.40.pptx
@@ -3246,7 +3246,7 @@
                     <a:lstStyle/>
                     <a:p>
                       <a:r>
-                        <a:t>0 days 00:44:23.041000</a:t>
+                        <a:t>0 days 00:44:32.861000</a:t>
                       </a:r>
                     </a:p>
                   </a:txBody>
@@ -3272,7 +3272,7 @@
                     <a:lstStyle/>
                     <a:p>
                       <a:r>
-                        <a:t>29.750206944444443</a:t>
+                        <a:t>29.757495277777775</a:t>
                       </a:r>
                     </a:p>
                   </a:txBody>
@@ -3298,7 +3298,7 @@
                     <a:lstStyle/>
                     <a:p>
                       <a:r>
-                        <a:t>1500.779628262778</a:t>
+                        <a:t>1501.1567687794447</a:t>
                       </a:r>
                     </a:p>
                   </a:txBody>
@@ -3350,7 +3350,7 @@
                     <a:lstStyle/>
                     <a:p>
                       <a:r>
-                        <a:t>9.035</a:t>
+                        <a:t>9.025</a:t>
                       </a:r>
                     </a:p>
                   </a:txBody>
@@ -3376,6 +3376,32 @@
                     <a:lstStyle/>
                     <a:p>
                       <a:r>
+                        <a:t>98.0</a:t>
+                      </a:r>
+                    </a:p>
+                  </a:txBody>
+                  <a:tcPr/>
+                </a:tc>
+              </a:tr>
+              <a:tr h="326571">
+                <a:tc>
+                  <a:txBody>
+                    <a:bodyPr/>
+                    <a:lstStyle/>
+                    <a:p>
+                      <a:r>
+                        <a:t>Ending SoC (%)</a:t>
+                      </a:r>
+                    </a:p>
+                  </a:txBody>
+                  <a:tcPr/>
+                </a:tc>
+                <a:tc>
+                  <a:txBody>
+                    <a:bodyPr/>
+                    <a:lstStyle/>
+                    <a:p>
+                      <a:r>
                         <a:t>22.0</a:t>
                       </a:r>
                     </a:p>
@@ -3390,19 +3416,19 @@
                     <a:lstStyle/>
                     <a:p>
                       <a:r>
-                        <a:t>Ending SoC (%)</a:t>
-                      </a:r>
-                    </a:p>
-                  </a:txBody>
-                  <a:tcPr/>
-                </a:tc>
-                <a:tc>
-                  <a:txBody>
-                    <a:bodyPr/>
-                    <a:lstStyle/>
-                    <a:p>
-                      <a:r>
-                        <a:t>98.0</a:t>
+                        <a:t>Total distance covered (km)</a:t>
+                      </a:r>
+                    </a:p>
+                  </a:txBody>
+                  <a:tcPr/>
+                </a:tc>
+                <a:tc>
+                  <a:txBody>
+                    <a:bodyPr/>
+                    <a:lstStyle/>
+                    <a:p>
+                      <a:r>
+                        <a:t>30.62844142383255</a:t>
                       </a:r>
                     </a:p>
                   </a:txBody>
@@ -3416,19 +3442,19 @@
                     <a:lstStyle/>
                     <a:p>
                       <a:r>
-                        <a:t>Total distance covered (in kilometers)</a:t>
-                      </a:r>
-                    </a:p>
-                  </a:txBody>
-                  <a:tcPr/>
-                </a:tc>
-                <a:tc>
-                  <a:txBody>
-                    <a:bodyPr/>
-                    <a:lstStyle/>
-                    <a:p>
-                      <a:r>
-                        <a:t>30.625690105268312</a:t>
+                        <a:t>Total energy consumption(WH/KM)</a:t>
+                      </a:r>
+                    </a:p>
+                  </a:txBody>
+                  <a:tcPr/>
+                </a:tc>
+                <a:tc>
+                  <a:txBody>
+                    <a:bodyPr/>
+                    <a:lstStyle/>
+                    <a:p>
+                      <a:r>
+                        <a:t>49.011856268055716</a:t>
                       </a:r>
                     </a:p>
                   </a:txBody>
@@ -3442,19 +3468,19 @@
                     <a:lstStyle/>
                     <a:p>
                       <a:r>
-                        <a:t>WH/KM</a:t>
-                      </a:r>
-                    </a:p>
-                  </a:txBody>
-                  <a:tcPr/>
-                </a:tc>
-                <a:tc>
-                  <a:txBody>
-                    <a:bodyPr/>
-                    <a:lstStyle/>
-                    <a:p>
-                      <a:r>
-                        <a:t>49.00394482880926</a:t>
+                        <a:t>Total SOC consumed(%)</a:t>
+                      </a:r>
+                    </a:p>
+                  </a:txBody>
+                  <a:tcPr/>
+                </a:tc>
+                <a:tc>
+                  <a:txBody>
+                    <a:bodyPr/>
+                    <a:lstStyle/>
+                    <a:p>
+                      <a:r>
+                        <a:t>76.0</a:t>
                       </a:r>
                     </a:p>
                   </a:txBody>
@@ -3468,19 +3494,44 @@
                     <a:lstStyle/>
                     <a:p>
                       <a:r>
-                        <a:t>Total SOC consumed</a:t>
-                      </a:r>
-                    </a:p>
-                  </a:txBody>
-                  <a:tcPr/>
-                </a:tc>
-                <a:tc>
-                  <a:txBody>
-                    <a:bodyPr/>
-                    <a:lstStyle/>
-                    <a:p>
-                      <a:r>
-                        <a:t>76.0</a:t>
+                        <a:t>Mode</a:t>
+                      </a:r>
+                    </a:p>
+                  </a:txBody>
+                  <a:tcPr/>
+                </a:tc>
+                <a:tc>
+                  <a:txBody>
+                    <a:bodyPr/>
+                    <a:lstStyle/>
+                    <a:p>
+                      <a:r>
+                        <a:t>Custom mode</a:t>
+                      </a:r>
+                    </a:p>
+                    <a:p>
+                      <a:r>
+                        <a:t>84.72%</a:t>
+                      </a:r>
+                    </a:p>
+                    <a:p>
+                      <a:r>
+                        <a:t>Eco mode</a:t>
+                      </a:r>
+                    </a:p>
+                    <a:p>
+                      <a:r>
+                        <a:t>14.25%</a:t>
+                      </a:r>
+                    </a:p>
+                    <a:p>
+                      <a:r>
+                        <a:t>Sports mode</a:t>
+                      </a:r>
+                    </a:p>
+                    <a:p>
+                      <a:r>
+                        <a:t>0.04%</a:t>
                       </a:r>
                     </a:p>
                   </a:txBody>
@@ -3494,58 +3545,7 @@
                     <a:lstStyle/>
                     <a:p>
                       <a:r>
-                        <a:t>Mode</a:t>
-                      </a:r>
-                    </a:p>
-                  </a:txBody>
-                  <a:tcPr/>
-                </a:tc>
-                <a:tc>
-                  <a:txBody>
-                    <a:bodyPr/>
-                    <a:lstStyle/>
-                    <a:p>
-                      <a:r>
-                        <a:t>Custom mode</a:t>
-                      </a:r>
-                    </a:p>
-                    <a:p>
-                      <a:r>
-                        <a:t>85.04%</a:t>
-                      </a:r>
-                    </a:p>
-                    <a:p>
-                      <a:r>
-                        <a:t>Eco mode</a:t>
-                      </a:r>
-                    </a:p>
-                    <a:p>
-                      <a:r>
-                        <a:t>13.92%</a:t>
-                      </a:r>
-                    </a:p>
-                    <a:p>
-                      <a:r>
-                        <a:t>Sports mode</a:t>
-                      </a:r>
-                    </a:p>
-                    <a:p>
-                      <a:r>
-                        <a:t>0.04%</a:t>
-                      </a:r>
-                    </a:p>
-                  </a:txBody>
-                  <a:tcPr/>
-                </a:tc>
-              </a:tr>
-              <a:tr h="326571">
-                <a:tc>
-                  <a:txBody>
-                    <a:bodyPr/>
-                    <a:lstStyle/>
-                    <a:p>
-                      <a:r>
-                        <a:t>Peak Power</a:t>
+                        <a:t>Peak Power(kW)</a:t>
                       </a:r>
                     </a:p>
                   </a:txBody>
@@ -3571,19 +3571,19 @@
                     <a:lstStyle/>
                     <a:p>
                       <a:r>
-                        <a:t>Average Power</a:t>
-                      </a:r>
-                    </a:p>
-                  </a:txBody>
-                  <a:tcPr/>
-                </a:tc>
-                <a:tc>
-                  <a:txBody>
-                    <a:bodyPr/>
-                    <a:lstStyle/>
-                    <a:p>
-                      <a:r>
-                        <a:t>-2035.722178502638</a:t>
+                        <a:t>Average Power(kW)</a:t>
+                      </a:r>
+                    </a:p>
+                  </a:txBody>
+                  <a:tcPr/>
+                </a:tc>
+                <a:tc>
+                  <a:txBody>
+                    <a:bodyPr/>
+                    <a:lstStyle/>
+                    <a:p>
+                      <a:r>
+                        <a:t>-2028.5902280803307</a:t>
                       </a:r>
                     </a:p>
                   </a:txBody>
@@ -3688,7 +3688,7 @@
                     <a:lstStyle/>
                     <a:p>
                       <a:r>
-                        <a:t>Total Energy Regenerated</a:t>
+                        <a:t>Total Energy Regenerated(kWh)</a:t>
                       </a:r>
                     </a:p>
                   </a:txBody>
@@ -3714,19 +3714,19 @@
                     <a:lstStyle/>
                     <a:p>
                       <a:r>
-                        <a:t>Regenerative Effectiveness</a:t>
-                      </a:r>
-                    </a:p>
-                  </a:txBody>
-                  <a:tcPr/>
-                </a:tc>
-                <a:tc>
-                  <a:txBody>
-                    <a:bodyPr/>
-                    <a:lstStyle/>
-                    <a:p>
-                      <a:r>
-                        <a:t>-0.000854977994777095</a:t>
+                        <a:t>Regenerative Effectiveness(%)</a:t>
+                      </a:r>
+                    </a:p>
+                  </a:txBody>
+                  <a:tcPr/>
+                </a:tc>
+                <a:tc>
+                  <a:txBody>
+                    <a:bodyPr/>
+                    <a:lstStyle/>
+                    <a:p>
+                      <a:r>
+                        <a:t>0.0008547631976997756</a:t>
                       </a:r>
                     </a:p>
                   </a:txBody>
@@ -3740,7 +3740,33 @@
                     <a:lstStyle/>
                     <a:p>
                       <a:r>
-                        <a:t>Lowest Cell Voltage</a:t>
+                        <a:t>Highest Cell Voltage(V)</a:t>
+                      </a:r>
+                    </a:p>
+                  </a:txBody>
+                  <a:tcPr/>
+                </a:tc>
+                <a:tc>
+                  <a:txBody>
+                    <a:bodyPr/>
+                    <a:lstStyle/>
+                    <a:p>
+                      <a:r>
+                        <a:t>3.329</a:t>
+                      </a:r>
+                    </a:p>
+                  </a:txBody>
+                  <a:tcPr/>
+                </a:tc>
+              </a:tr>
+              <a:tr h="326571">
+                <a:tc>
+                  <a:txBody>
+                    <a:bodyPr/>
+                    <a:lstStyle/>
+                    <a:p>
+                      <a:r>
+                        <a:t>Lowest Cell Voltage(V)</a:t>
                       </a:r>
                     </a:p>
                   </a:txBody>
@@ -3766,19 +3792,19 @@
                     <a:lstStyle/>
                     <a:p>
                       <a:r>
-                        <a:t>Highest Cell Voltage</a:t>
-                      </a:r>
-                    </a:p>
-                  </a:txBody>
-                  <a:tcPr/>
-                </a:tc>
-                <a:tc>
-                  <a:txBody>
-                    <a:bodyPr/>
-                    <a:lstStyle/>
-                    <a:p>
-                      <a:r>
-                        <a:t>3.329</a:t>
+                        <a:t>Difference in Cell Voltage(V)</a:t>
+                      </a:r>
+                    </a:p>
+                  </a:txBody>
+                  <a:tcPr/>
+                </a:tc>
+                <a:tc>
+                  <a:txBody>
+                    <a:bodyPr/>
+                    <a:lstStyle/>
+                    <a:p>
+                      <a:r>
+                        <a:t>0.3120000000000003</a:t>
                       </a:r>
                     </a:p>
                   </a:txBody>
@@ -3792,19 +3818,19 @@
                     <a:lstStyle/>
                     <a:p>
                       <a:r>
-                        <a:t>Difference in Cell Voltage</a:t>
-                      </a:r>
-                    </a:p>
-                  </a:txBody>
-                  <a:tcPr/>
-                </a:tc>
-                <a:tc>
-                  <a:txBody>
-                    <a:bodyPr/>
-                    <a:lstStyle/>
-                    <a:p>
-                      <a:r>
-                        <a:t>0.3120000000000003</a:t>
+                        <a:t>Minimum Temperature(C)</a:t>
+                      </a:r>
+                    </a:p>
+                  </a:txBody>
+                  <a:tcPr/>
+                </a:tc>
+                <a:tc>
+                  <a:txBody>
+                    <a:bodyPr/>
+                    <a:lstStyle/>
+                    <a:p>
+                      <a:r>
+                        <a:t>26.0</a:t>
                       </a:r>
                     </a:p>
                   </a:txBody>
@@ -3818,19 +3844,19 @@
                     <a:lstStyle/>
                     <a:p>
                       <a:r>
-                        <a:t>Minimum Temperature</a:t>
-                      </a:r>
-                    </a:p>
-                  </a:txBody>
-                  <a:tcPr/>
-                </a:tc>
-                <a:tc>
-                  <a:txBody>
-                    <a:bodyPr/>
-                    <a:lstStyle/>
-                    <a:p>
-                      <a:r>
-                        <a:t>26.0</a:t>
+                        <a:t>Maximum Temperature(C)</a:t>
+                      </a:r>
+                    </a:p>
+                  </a:txBody>
+                  <a:tcPr/>
+                </a:tc>
+                <a:tc>
+                  <a:txBody>
+                    <a:bodyPr/>
+                    <a:lstStyle/>
+                    <a:p>
+                      <a:r>
+                        <a:t>40.0</a:t>
                       </a:r>
                     </a:p>
                   </a:txBody>
@@ -3844,19 +3870,19 @@
                     <a:lstStyle/>
                     <a:p>
                       <a:r>
-                        <a:t>Maximum Temperature</a:t>
-                      </a:r>
-                    </a:p>
-                  </a:txBody>
-                  <a:tcPr/>
-                </a:tc>
-                <a:tc>
-                  <a:txBody>
-                    <a:bodyPr/>
-                    <a:lstStyle/>
-                    <a:p>
-                      <a:r>
-                        <a:t>40.0</a:t>
+                        <a:t>Difference in Temperature(C)</a:t>
+                      </a:r>
+                    </a:p>
+                  </a:txBody>
+                  <a:tcPr/>
+                </a:tc>
+                <a:tc>
+                  <a:txBody>
+                    <a:bodyPr/>
+                    <a:lstStyle/>
+                    <a:p>
+                      <a:r>
+                        <a:t>14.0</a:t>
                       </a:r>
                     </a:p>
                   </a:txBody>
@@ -3870,19 +3896,19 @@
                     <a:lstStyle/>
                     <a:p>
                       <a:r>
-                        <a:t>Difference in Temperature</a:t>
-                      </a:r>
-                    </a:p>
-                  </a:txBody>
-                  <a:tcPr/>
-                </a:tc>
-                <a:tc>
-                  <a:txBody>
-                    <a:bodyPr/>
-                    <a:lstStyle/>
-                    <a:p>
-                      <a:r>
-                        <a:t>nan</a:t>
+                        <a:t>Maximum Fet Temperature-BMS(C)</a:t>
+                      </a:r>
+                    </a:p>
+                  </a:txBody>
+                  <a:tcPr/>
+                </a:tc>
+                <a:tc>
+                  <a:txBody>
+                    <a:bodyPr/>
+                    <a:lstStyle/>
+                    <a:p>
+                      <a:r>
+                        <a:t>62.0</a:t>
                       </a:r>
                     </a:p>
                   </a:txBody>
@@ -3896,19 +3922,19 @@
                     <a:lstStyle/>
                     <a:p>
                       <a:r>
-                        <a:t>Maximum Fet Temperature</a:t>
-                      </a:r>
-                    </a:p>
-                  </a:txBody>
-                  <a:tcPr/>
-                </a:tc>
-                <a:tc>
-                  <a:txBody>
-                    <a:bodyPr/>
-                    <a:lstStyle/>
-                    <a:p>
-                      <a:r>
-                        <a:t>62.0</a:t>
+                        <a:t>Maximum Afe Temperature-BMS(C)</a:t>
+                      </a:r>
+                    </a:p>
+                  </a:txBody>
+                  <a:tcPr/>
+                </a:tc>
+                <a:tc>
+                  <a:txBody>
+                    <a:bodyPr/>
+                    <a:lstStyle/>
+                    <a:p>
+                      <a:r>
+                        <a:t>60.0</a:t>
                       </a:r>
                     </a:p>
                   </a:txBody>
@@ -3922,19 +3948,19 @@
                     <a:lstStyle/>
                     <a:p>
                       <a:r>
-                        <a:t>Maximum Afe Temperature</a:t>
-                      </a:r>
-                    </a:p>
-                  </a:txBody>
-                  <a:tcPr/>
-                </a:tc>
-                <a:tc>
-                  <a:txBody>
-                    <a:bodyPr/>
-                    <a:lstStyle/>
-                    <a:p>
-                      <a:r>
-                        <a:t>60.0</a:t>
+                        <a:t>Maximum PCB Temperature-BMS(C)</a:t>
+                      </a:r>
+                    </a:p>
+                  </a:txBody>
+                  <a:tcPr/>
+                </a:tc>
+                <a:tc>
+                  <a:txBody>
+                    <a:bodyPr/>
+                    <a:lstStyle/>
+                    <a:p>
+                      <a:r>
+                        <a:t>57.0</a:t>
                       </a:r>
                     </a:p>
                   </a:txBody>
@@ -3948,33 +3974,7 @@
                     <a:lstStyle/>
                     <a:p>
                       <a:r>
-                        <a:t>Maximum PCB Temperature</a:t>
-                      </a:r>
-                    </a:p>
-                  </a:txBody>
-                  <a:tcPr/>
-                </a:tc>
-                <a:tc>
-                  <a:txBody>
-                    <a:bodyPr/>
-                    <a:lstStyle/>
-                    <a:p>
-                      <a:r>
-                        <a:t>57.0</a:t>
-                      </a:r>
-                    </a:p>
-                  </a:txBody>
-                  <a:tcPr/>
-                </a:tc>
-              </a:tr>
-              <a:tr h="326571">
-                <a:tc>
-                  <a:txBody>
-                    <a:bodyPr/>
-                    <a:lstStyle/>
-                    <a:p>
-                      <a:r>
-                        <a:t>Maximum MCU Temperature</a:t>
+                        <a:t>Maximum MCU Temperature(C)</a:t>
                       </a:r>
                     </a:p>
                   </a:txBody>
@@ -4000,7 +4000,7 @@
                     <a:lstStyle/>
                     <a:p>
                       <a:r>
-                        <a:t>Maximum Motor Temperature</a:t>
+                        <a:t>Maximum Motor Temperature(C)</a:t>
                       </a:r>
                     </a:p>
                   </a:txBody>
@@ -4117,7 +4117,7 @@
                     <a:lstStyle/>
                     <a:p>
                       <a:r>
-                        <a:t>Abnormal Motor Temperature Detected</a:t>
+                        <a:t>Abnormal Motor Temperature Detected(C)</a:t>
                       </a:r>
                     </a:p>
                   </a:txBody>
@@ -4143,7 +4143,7 @@
                     <a:lstStyle/>
                     <a:p>
                       <a:r>
-                        <a:t>lowest cell temp</a:t>
+                        <a:t>highest cell temp(C)</a:t>
                       </a:r>
                     </a:p>
                   </a:txBody>
@@ -4169,7 +4169,7 @@
                     <a:lstStyle/>
                     <a:p>
                       <a:r>
-                        <a:t>highest cell temp</a:t>
+                        <a:t>lowest cell temp(C)</a:t>
                       </a:r>
                     </a:p>
                   </a:txBody>
@@ -4195,7 +4195,7 @@
                     <a:lstStyle/>
                     <a:p>
                       <a:r>
-                        <a:t>Difference between Highest and Lowest Cell Temperature at 100% SOC</a:t>
+                        <a:t>Difference between Highest and Lowest Cell Temperature at 100% SOC(C)</a:t>
                       </a:r>
                     </a:p>
                   </a:txBody>
@@ -4221,19 +4221,19 @@
                     <a:lstStyle/>
                     <a:p>
                       <a:r>
-                        <a:t>Maximum BMS Temperature in C</a:t>
-                      </a:r>
-                    </a:p>
-                  </a:txBody>
-                  <a:tcPr/>
-                </a:tc>
-                <a:tc>
-                  <a:txBody>
-                    <a:bodyPr/>
-                    <a:lstStyle/>
-                    <a:p>
-                      <a:r>
-                        <a:t>62.0</a:t>
+                        <a:t>Battery Voltage(V)</a:t>
+                      </a:r>
+                    </a:p>
+                  </a:txBody>
+                  <a:tcPr/>
+                </a:tc>
+                <a:tc>
+                  <a:txBody>
+                    <a:bodyPr/>
+                    <a:lstStyle/>
+                    <a:p>
+                      <a:r>
+                        <a:t>53.0</a:t>
                       </a:r>
                     </a:p>
                   </a:txBody>
@@ -4247,19 +4247,19 @@
                     <a:lstStyle/>
                     <a:p>
                       <a:r>
-                        <a:t>Battery Voltage</a:t>
-                      </a:r>
-                    </a:p>
-                  </a:txBody>
-                  <a:tcPr/>
-                </a:tc>
-                <a:tc>
-                  <a:txBody>
-                    <a:bodyPr/>
-                    <a:lstStyle/>
-                    <a:p>
-                      <a:r>
-                        <a:t>5.3</a:t>
+                        <a:t>Total energy charged(kWh)</a:t>
+                      </a:r>
+                    </a:p>
+                  </a:txBody>
+                  <a:tcPr/>
+                </a:tc>
+                <a:tc>
+                  <a:txBody>
+                    <a:bodyPr/>
+                    <a:lstStyle/>
+                    <a:p>
+                      <a:r>
+                        <a:t>1.577147249722222</a:t>
                       </a:r>
                     </a:p>
                   </a:txBody>
@@ -4273,19 +4273,19 @@
                     <a:lstStyle/>
                     <a:p>
                       <a:r>
-                        <a:t>Total energy charged in kWh</a:t>
-                      </a:r>
-                    </a:p>
-                  </a:txBody>
-                  <a:tcPr/>
-                </a:tc>
-                <a:tc>
-                  <a:txBody>
-                    <a:bodyPr/>
-                    <a:lstStyle/>
-                    <a:p>
-                      <a:r>
-                        <a:t>0.15767609680555555</a:t>
+                        <a:t>Electricity consumption units(kW)</a:t>
+                      </a:r>
+                    </a:p>
+                  </a:txBody>
+                  <a:tcPr/>
+                </a:tc>
+                <a:tc>
+                  <a:txBody>
+                    <a:bodyPr/>
+                    <a:lstStyle/>
+                    <a:p>
+                      <a:r>
+                        <a:t>1.6395825533539401e-07</a:t>
                       </a:r>
                     </a:p>
                   </a:txBody>
@@ -4299,19 +4299,19 @@
                     <a:lstStyle/>
                     <a:p>
                       <a:r>
-                        <a:t>Electricity consumption units in kW</a:t>
-                      </a:r>
-                    </a:p>
-                  </a:txBody>
-                  <a:tcPr/>
-                </a:tc>
-                <a:tc>
-                  <a:txBody>
-                    <a:bodyPr/>
-                    <a:lstStyle/>
-                    <a:p>
-                      <a:r>
-                        <a:t>1.6447208328697328e-08</a:t>
+                        <a:t>Idling time percentage</a:t>
+                      </a:r>
+                    </a:p>
+                  </a:txBody>
+                  <a:tcPr/>
+                </a:tc>
+                <a:tc>
+                  <a:txBody>
+                    <a:bodyPr/>
+                    <a:lstStyle/>
+                    <a:p>
+                      <a:r>
+                        <a:t>7.848300255452938</a:t>
                       </a:r>
                     </a:p>
                   </a:txBody>
@@ -4325,19 +4325,19 @@
                     <a:lstStyle/>
                     <a:p>
                       <a:r>
-                        <a:t>Idling time percentage</a:t>
-                      </a:r>
-                    </a:p>
-                  </a:txBody>
-                  <a:tcPr/>
-                </a:tc>
-                <a:tc>
-                  <a:txBody>
-                    <a:bodyPr/>
-                    <a:lstStyle/>
-                    <a:p>
-                      <a:r>
-                        <a:t>6.458357991083758</a:t>
+                        <a:t>Time spent in 0-10 km/h</a:t>
+                      </a:r>
+                    </a:p>
+                  </a:txBody>
+                  <a:tcPr/>
+                </a:tc>
+                <a:tc>
+                  <a:txBody>
+                    <a:bodyPr/>
+                    <a:lstStyle/>
+                    <a:p>
+                      <a:r>
+                        <a:t>10.556101395166044</a:t>
                       </a:r>
                     </a:p>
                   </a:txBody>
@@ -4351,19 +4351,19 @@
                     <a:lstStyle/>
                     <a:p>
                       <a:r>
-                        <a:t>Time spent in 0-10 km/h</a:t>
-                      </a:r>
-                    </a:p>
-                  </a:txBody>
-                  <a:tcPr/>
-                </a:tc>
-                <a:tc>
-                  <a:txBody>
-                    <a:bodyPr/>
-                    <a:lstStyle/>
-                    <a:p>
-                      <a:r>
-                        <a:t>16.952696571586383</a:t>
+                        <a:t>Time spent in 10-20 km/h</a:t>
+                      </a:r>
+                    </a:p>
+                  </a:txBody>
+                  <a:tcPr/>
+                </a:tc>
+                <a:tc>
+                  <a:txBody>
+                    <a:bodyPr/>
+                    <a:lstStyle/>
+                    <a:p>
+                      <a:r>
+                        <a:t>5.380231872666536</a:t>
                       </a:r>
                     </a:p>
                   </a:txBody>
@@ -4377,19 +4377,19 @@
                     <a:lstStyle/>
                     <a:p>
                       <a:r>
-                        <a:t>Time spent in 10-20 km/h</a:t>
-                      </a:r>
-                    </a:p>
-                  </a:txBody>
-                  <a:tcPr/>
-                </a:tc>
-                <a:tc>
-                  <a:txBody>
-                    <a:bodyPr/>
-                    <a:lstStyle/>
-                    <a:p>
-                      <a:r>
-                        <a:t>5.3694717323549135</a:t>
+                        <a:t>Time spent in 20-30 km/h</a:t>
+                      </a:r>
+                    </a:p>
+                  </a:txBody>
+                  <a:tcPr/>
+                </a:tc>
+                <a:tc>
+                  <a:txBody>
+                    <a:bodyPr/>
+                    <a:lstStyle/>
+                    <a:p>
+                      <a:r>
+                        <a:t>8.630379249361368</a:t>
                       </a:r>
                     </a:p>
                   </a:txBody>
@@ -4403,19 +4403,19 @@
                     <a:lstStyle/>
                     <a:p>
                       <a:r>
-                        <a:t>Time spent in 20-30 km/h</a:t>
-                      </a:r>
-                    </a:p>
-                  </a:txBody>
-                  <a:tcPr/>
-                </a:tc>
-                <a:tc>
-                  <a:txBody>
-                    <a:bodyPr/>
-                    <a:lstStyle/>
-                    <a:p>
-                      <a:r>
-                        <a:t>8.675582909220026</a:t>
+                        <a:t>Time spent in 30-40 km/h</a:t>
+                      </a:r>
+                    </a:p>
+                  </a:txBody>
+                  <a:tcPr/>
+                </a:tc>
+                <a:tc>
+                  <a:txBody>
+                    <a:bodyPr/>
+                    <a:lstStyle/>
+                    <a:p>
+                      <a:r>
+                        <a:t>13.29534289644331</a:t>
                       </a:r>
                     </a:p>
                   </a:txBody>
@@ -4429,19 +4429,19 @@
                     <a:lstStyle/>
                     <a:p>
                       <a:r>
-                        <a:t>Time spent in 30-40 km/h</a:t>
-                      </a:r>
-                    </a:p>
-                  </a:txBody>
-                  <a:tcPr/>
-                </a:tc>
-                <a:tc>
-                  <a:txBody>
-                    <a:bodyPr/>
-                    <a:lstStyle/>
-                    <a:p>
-                      <a:r>
-                        <a:t>13.358582869767623</a:t>
+                        <a:t>Time spent in 40-50 km/h</a:t>
+                      </a:r>
+                    </a:p>
+                  </a:txBody>
+                  <a:tcPr/>
+                </a:tc>
+                <a:tc>
+                  <a:txBody>
+                    <a:bodyPr/>
+                    <a:lstStyle/>
+                    <a:p>
+                      <a:r>
+                        <a:t>12.1988602868933</a:t>
                       </a:r>
                     </a:p>
                   </a:txBody>
@@ -4546,19 +4546,19 @@
                     <a:lstStyle/>
                     <a:p>
                       <a:r>
-                        <a:t>Time spent in 40-50 km/h</a:t>
-                      </a:r>
-                    </a:p>
-                  </a:txBody>
-                  <a:tcPr/>
-                </a:tc>
-                <a:tc>
-                  <a:txBody>
-                    <a:bodyPr/>
-                    <a:lstStyle/>
-                    <a:p>
-                      <a:r>
-                        <a:t>12.277587091174498</a:t>
+                        <a:t>Time spent in 50-60 km/h</a:t>
+                      </a:r>
+                    </a:p>
+                  </a:txBody>
+                  <a:tcPr/>
+                </a:tc>
+                <a:tc>
+                  <a:txBody>
+                    <a:bodyPr/>
+                    <a:lstStyle/>
+                    <a:p>
+                      <a:r>
+                        <a:t>12.587934761249755</a:t>
                       </a:r>
                     </a:p>
                   </a:txBody>
@@ -4572,19 +4572,19 @@
                     <a:lstStyle/>
                     <a:p>
                       <a:r>
-                        <a:t>Time spent in 50-60 km/h</a:t>
-                      </a:r>
-                    </a:p>
-                  </a:txBody>
-                  <a:tcPr/>
-                </a:tc>
-                <a:tc>
-                  <a:txBody>
-                    <a:bodyPr/>
-                    <a:lstStyle/>
-                    <a:p>
-                      <a:r>
-                        <a:t>12.65633013768888</a:t>
+                        <a:t>Time spent in 60-70 km/h</a:t>
+                      </a:r>
+                    </a:p>
+                  </a:txBody>
+                  <a:tcPr/>
+                </a:tc>
+                <a:tc>
+                  <a:txBody>
+                    <a:bodyPr/>
+                    <a:lstStyle/>
+                    <a:p>
+                      <a:r>
+                        <a:t>19.68952642955394</a:t>
                       </a:r>
                     </a:p>
                   </a:txBody>
@@ -4598,19 +4598,19 @@
                     <a:lstStyle/>
                     <a:p>
                       <a:r>
-                        <a:t>Time spent in 60-70 km/h</a:t>
-                      </a:r>
-                    </a:p>
-                  </a:txBody>
-                  <a:tcPr/>
-                </a:tc>
-                <a:tc>
-                  <a:txBody>
-                    <a:bodyPr/>
-                    <a:lstStyle/>
-                    <a:p>
-                      <a:r>
-                        <a:t>19.78143370024066</a:t>
+                        <a:t>Time spent in 70-80 km/h</a:t>
+                      </a:r>
+                    </a:p>
+                  </a:txBody>
+                  <a:tcPr/>
+                </a:tc>
+                <a:tc>
+                  <a:txBody>
+                    <a:bodyPr/>
+                    <a:lstStyle/>
+                    <a:p>
+                      <a:r>
+                        <a:t>9.660051090587542</a:t>
                       </a:r>
                     </a:p>
                   </a:txBody>
@@ -4622,15 +4622,23 @@
                   <a:txBody>
                     <a:bodyPr/>
                     <a:lstStyle/>
-                    <a:p/>
-                  </a:txBody>
-                  <a:tcPr/>
-                </a:tc>
-                <a:tc>
-                  <a:txBody>
-                    <a:bodyPr/>
-                    <a:lstStyle/>
-                    <a:p/>
+                    <a:p>
+                      <a:r>
+                        <a:t>Time spent in 80-90 km/h</a:t>
+                      </a:r>
+                    </a:p>
+                  </a:txBody>
+                  <a:tcPr/>
+                </a:tc>
+                <a:tc>
+                  <a:txBody>
+                    <a:bodyPr/>
+                    <a:lstStyle/>
+                    <a:p>
+                      <a:r>
+                        <a:t>0.0</a:t>
+                      </a:r>
+                    </a:p>
                   </a:txBody>
                   <a:tcPr/>
                 </a:tc>

</xml_diff>

<commit_message>
Added 'Date and Time' and 'Cycle_count' parameters
</commit_message>
<xml_diff>
--- a/Automationdashboard/MAIN_FOLDER/Automation_Dashboard_Batterywise/V2/D11_03_2024/B4_BT02_09.56_10.40/analysis_B4_BT02_09.56_10.40.pptx
+++ b/Automationdashboard/MAIN_FOLDER/Automation_Dashboard_Batterywise/V2/D11_03_2024/B4_BT02_09.56_10.40/analysis_B4_BT02_09.56_10.40.pptx
@@ -3234,6 +3234,32 @@
                     <a:lstStyle/>
                     <a:p>
                       <a:r>
+                        <a:t>Date and Time</a:t>
+                      </a:r>
+                    </a:p>
+                  </a:txBody>
+                  <a:tcPr/>
+                </a:tc>
+                <a:tc>
+                  <a:txBody>
+                    <a:bodyPr/>
+                    <a:lstStyle/>
+                    <a:p>
+                      <a:r>
+                        <a:t>2024-03-11 09:55:45.892000 to 2024-03-11 10:40:22.873000</a:t>
+                      </a:r>
+                    </a:p>
+                  </a:txBody>
+                  <a:tcPr/>
+                </a:tc>
+              </a:tr>
+              <a:tr h="326571">
+                <a:tc>
+                  <a:txBody>
+                    <a:bodyPr/>
+                    <a:lstStyle/>
+                    <a:p>
+                      <a:r>
                         <a:t>Total time taken for the ride</a:t>
                       </a:r>
                     </a:p>
@@ -3376,6 +3402,32 @@
                     <a:lstStyle/>
                     <a:p>
                       <a:r>
+                        <a:t>98.0</a:t>
+                      </a:r>
+                    </a:p>
+                  </a:txBody>
+                  <a:tcPr/>
+                </a:tc>
+              </a:tr>
+              <a:tr h="326571">
+                <a:tc>
+                  <a:txBody>
+                    <a:bodyPr/>
+                    <a:lstStyle/>
+                    <a:p>
+                      <a:r>
+                        <a:t>Ending SoC (%)</a:t>
+                      </a:r>
+                    </a:p>
+                  </a:txBody>
+                  <a:tcPr/>
+                </a:tc>
+                <a:tc>
+                  <a:txBody>
+                    <a:bodyPr/>
+                    <a:lstStyle/>
+                    <a:p>
+                      <a:r>
                         <a:t>22.0</a:t>
                       </a:r>
                     </a:p>
@@ -3390,19 +3442,19 @@
                     <a:lstStyle/>
                     <a:p>
                       <a:r>
-                        <a:t>Ending SoC (%)</a:t>
-                      </a:r>
-                    </a:p>
-                  </a:txBody>
-                  <a:tcPr/>
-                </a:tc>
-                <a:tc>
-                  <a:txBody>
-                    <a:bodyPr/>
-                    <a:lstStyle/>
-                    <a:p>
-                      <a:r>
-                        <a:t>98.0</a:t>
+                        <a:t>Total distance covered (km)</a:t>
+                      </a:r>
+                    </a:p>
+                  </a:txBody>
+                  <a:tcPr/>
+                </a:tc>
+                <a:tc>
+                  <a:txBody>
+                    <a:bodyPr/>
+                    <a:lstStyle/>
+                    <a:p>
+                      <a:r>
+                        <a:t>30.625690105268312</a:t>
                       </a:r>
                     </a:p>
                   </a:txBody>
@@ -3416,19 +3468,19 @@
                     <a:lstStyle/>
                     <a:p>
                       <a:r>
-                        <a:t>Total distance covered (in kilometers)</a:t>
-                      </a:r>
-                    </a:p>
-                  </a:txBody>
-                  <a:tcPr/>
-                </a:tc>
-                <a:tc>
-                  <a:txBody>
-                    <a:bodyPr/>
-                    <a:lstStyle/>
-                    <a:p>
-                      <a:r>
-                        <a:t>30.625690105268312</a:t>
+                        <a:t>Total energy consumption(WH/KM)</a:t>
+                      </a:r>
+                    </a:p>
+                  </a:txBody>
+                  <a:tcPr/>
+                </a:tc>
+                <a:tc>
+                  <a:txBody>
+                    <a:bodyPr/>
+                    <a:lstStyle/>
+                    <a:p>
+                      <a:r>
+                        <a:t>49.00394482880926</a:t>
                       </a:r>
                     </a:p>
                   </a:txBody>
@@ -3442,19 +3494,19 @@
                     <a:lstStyle/>
                     <a:p>
                       <a:r>
-                        <a:t>WH/KM</a:t>
-                      </a:r>
-                    </a:p>
-                  </a:txBody>
-                  <a:tcPr/>
-                </a:tc>
-                <a:tc>
-                  <a:txBody>
-                    <a:bodyPr/>
-                    <a:lstStyle/>
-                    <a:p>
-                      <a:r>
-                        <a:t>49.00394482880926</a:t>
+                        <a:t>Total SOC consumed(%)</a:t>
+                      </a:r>
+                    </a:p>
+                  </a:txBody>
+                  <a:tcPr/>
+                </a:tc>
+                <a:tc>
+                  <a:txBody>
+                    <a:bodyPr/>
+                    <a:lstStyle/>
+                    <a:p>
+                      <a:r>
+                        <a:t>76.0</a:t>
                       </a:r>
                     </a:p>
                   </a:txBody>
@@ -3468,32 +3520,6 @@
                     <a:lstStyle/>
                     <a:p>
                       <a:r>
-                        <a:t>Total SOC consumed</a:t>
-                      </a:r>
-                    </a:p>
-                  </a:txBody>
-                  <a:tcPr/>
-                </a:tc>
-                <a:tc>
-                  <a:txBody>
-                    <a:bodyPr/>
-                    <a:lstStyle/>
-                    <a:p>
-                      <a:r>
-                        <a:t>76.0</a:t>
-                      </a:r>
-                    </a:p>
-                  </a:txBody>
-                  <a:tcPr/>
-                </a:tc>
-              </a:tr>
-              <a:tr h="326571">
-                <a:tc>
-                  <a:txBody>
-                    <a:bodyPr/>
-                    <a:lstStyle/>
-                    <a:p>
-                      <a:r>
                         <a:t>Mode</a:t>
                       </a:r>
                     </a:p>
@@ -3538,14 +3564,14 @@
                   <a:tcPr/>
                 </a:tc>
               </a:tr>
-              <a:tr h="326571">
-                <a:tc>
-                  <a:txBody>
-                    <a:bodyPr/>
-                    <a:lstStyle/>
-                    <a:p>
-                      <a:r>
-                        <a:t>Peak Power</a:t>
+              <a:tr h="326577">
+                <a:tc>
+                  <a:txBody>
+                    <a:bodyPr/>
+                    <a:lstStyle/>
+                    <a:p>
+                      <a:r>
+                        <a:t>Peak Power(kW)</a:t>
                       </a:r>
                     </a:p>
                   </a:txBody>
@@ -3558,32 +3584,6 @@
                     <a:p>
                       <a:r>
                         <a:t>5427.163392</a:t>
-                      </a:r>
-                    </a:p>
-                  </a:txBody>
-                  <a:tcPr/>
-                </a:tc>
-              </a:tr>
-              <a:tr h="326577">
-                <a:tc>
-                  <a:txBody>
-                    <a:bodyPr/>
-                    <a:lstStyle/>
-                    <a:p>
-                      <a:r>
-                        <a:t>Average Power</a:t>
-                      </a:r>
-                    </a:p>
-                  </a:txBody>
-                  <a:tcPr/>
-                </a:tc>
-                <a:tc>
-                  <a:txBody>
-                    <a:bodyPr/>
-                    <a:lstStyle/>
-                    <a:p>
-                      <a:r>
-                        <a:t>-2035.722178502638</a:t>
                       </a:r>
                     </a:p>
                   </a:txBody>
@@ -3688,7 +3688,33 @@
                     <a:lstStyle/>
                     <a:p>
                       <a:r>
-                        <a:t>Total Energy Regenerated</a:t>
+                        <a:t>Average Power(kW)</a:t>
+                      </a:r>
+                    </a:p>
+                  </a:txBody>
+                  <a:tcPr/>
+                </a:tc>
+                <a:tc>
+                  <a:txBody>
+                    <a:bodyPr/>
+                    <a:lstStyle/>
+                    <a:p>
+                      <a:r>
+                        <a:t>-2035.722178502638</a:t>
+                      </a:r>
+                    </a:p>
+                  </a:txBody>
+                  <a:tcPr/>
+                </a:tc>
+              </a:tr>
+              <a:tr h="326571">
+                <a:tc>
+                  <a:txBody>
+                    <a:bodyPr/>
+                    <a:lstStyle/>
+                    <a:p>
+                      <a:r>
+                        <a:t>Total Energy Regenerated(kWh)</a:t>
                       </a:r>
                     </a:p>
                   </a:txBody>
@@ -3714,19 +3740,19 @@
                     <a:lstStyle/>
                     <a:p>
                       <a:r>
-                        <a:t>Regenerative Effectiveness</a:t>
-                      </a:r>
-                    </a:p>
-                  </a:txBody>
-                  <a:tcPr/>
-                </a:tc>
-                <a:tc>
-                  <a:txBody>
-                    <a:bodyPr/>
-                    <a:lstStyle/>
-                    <a:p>
-                      <a:r>
-                        <a:t>-0.000854977994777095</a:t>
+                        <a:t>Regenerative Effectiveness(%)</a:t>
+                      </a:r>
+                    </a:p>
+                  </a:txBody>
+                  <a:tcPr/>
+                </a:tc>
+                <a:tc>
+                  <a:txBody>
+                    <a:bodyPr/>
+                    <a:lstStyle/>
+                    <a:p>
+                      <a:r>
+                        <a:t>0.000854977994777095</a:t>
                       </a:r>
                     </a:p>
                   </a:txBody>
@@ -3740,7 +3766,33 @@
                     <a:lstStyle/>
                     <a:p>
                       <a:r>
-                        <a:t>Lowest Cell Voltage</a:t>
+                        <a:t>Highest Cell Voltage(V)</a:t>
+                      </a:r>
+                    </a:p>
+                  </a:txBody>
+                  <a:tcPr/>
+                </a:tc>
+                <a:tc>
+                  <a:txBody>
+                    <a:bodyPr/>
+                    <a:lstStyle/>
+                    <a:p>
+                      <a:r>
+                        <a:t>3.329</a:t>
+                      </a:r>
+                    </a:p>
+                  </a:txBody>
+                  <a:tcPr/>
+                </a:tc>
+              </a:tr>
+              <a:tr h="326571">
+                <a:tc>
+                  <a:txBody>
+                    <a:bodyPr/>
+                    <a:lstStyle/>
+                    <a:p>
+                      <a:r>
+                        <a:t>Lowest Cell Voltage(V)</a:t>
                       </a:r>
                     </a:p>
                   </a:txBody>
@@ -3766,19 +3818,19 @@
                     <a:lstStyle/>
                     <a:p>
                       <a:r>
-                        <a:t>Highest Cell Voltage</a:t>
-                      </a:r>
-                    </a:p>
-                  </a:txBody>
-                  <a:tcPr/>
-                </a:tc>
-                <a:tc>
-                  <a:txBody>
-                    <a:bodyPr/>
-                    <a:lstStyle/>
-                    <a:p>
-                      <a:r>
-                        <a:t>3.329</a:t>
+                        <a:t>Difference in Cell Voltage(V)</a:t>
+                      </a:r>
+                    </a:p>
+                  </a:txBody>
+                  <a:tcPr/>
+                </a:tc>
+                <a:tc>
+                  <a:txBody>
+                    <a:bodyPr/>
+                    <a:lstStyle/>
+                    <a:p>
+                      <a:r>
+                        <a:t>0.3120000000000003</a:t>
                       </a:r>
                     </a:p>
                   </a:txBody>
@@ -3792,19 +3844,19 @@
                     <a:lstStyle/>
                     <a:p>
                       <a:r>
-                        <a:t>Difference in Cell Voltage</a:t>
-                      </a:r>
-                    </a:p>
-                  </a:txBody>
-                  <a:tcPr/>
-                </a:tc>
-                <a:tc>
-                  <a:txBody>
-                    <a:bodyPr/>
-                    <a:lstStyle/>
-                    <a:p>
-                      <a:r>
-                        <a:t>0.3120000000000003</a:t>
+                        <a:t>Minimum Temperature(C)</a:t>
+                      </a:r>
+                    </a:p>
+                  </a:txBody>
+                  <a:tcPr/>
+                </a:tc>
+                <a:tc>
+                  <a:txBody>
+                    <a:bodyPr/>
+                    <a:lstStyle/>
+                    <a:p>
+                      <a:r>
+                        <a:t>26.0</a:t>
                       </a:r>
                     </a:p>
                   </a:txBody>
@@ -3818,19 +3870,19 @@
                     <a:lstStyle/>
                     <a:p>
                       <a:r>
-                        <a:t>Minimum Temperature</a:t>
-                      </a:r>
-                    </a:p>
-                  </a:txBody>
-                  <a:tcPr/>
-                </a:tc>
-                <a:tc>
-                  <a:txBody>
-                    <a:bodyPr/>
-                    <a:lstStyle/>
-                    <a:p>
-                      <a:r>
-                        <a:t>26.0</a:t>
+                        <a:t>Maximum Temperature(C)</a:t>
+                      </a:r>
+                    </a:p>
+                  </a:txBody>
+                  <a:tcPr/>
+                </a:tc>
+                <a:tc>
+                  <a:txBody>
+                    <a:bodyPr/>
+                    <a:lstStyle/>
+                    <a:p>
+                      <a:r>
+                        <a:t>40.0</a:t>
                       </a:r>
                     </a:p>
                   </a:txBody>
@@ -3844,19 +3896,19 @@
                     <a:lstStyle/>
                     <a:p>
                       <a:r>
-                        <a:t>Maximum Temperature</a:t>
-                      </a:r>
-                    </a:p>
-                  </a:txBody>
-                  <a:tcPr/>
-                </a:tc>
-                <a:tc>
-                  <a:txBody>
-                    <a:bodyPr/>
-                    <a:lstStyle/>
-                    <a:p>
-                      <a:r>
-                        <a:t>40.0</a:t>
+                        <a:t>Difference in Temperature(C)</a:t>
+                      </a:r>
+                    </a:p>
+                  </a:txBody>
+                  <a:tcPr/>
+                </a:tc>
+                <a:tc>
+                  <a:txBody>
+                    <a:bodyPr/>
+                    <a:lstStyle/>
+                    <a:p>
+                      <a:r>
+                        <a:t>14.0</a:t>
                       </a:r>
                     </a:p>
                   </a:txBody>
@@ -3870,19 +3922,19 @@
                     <a:lstStyle/>
                     <a:p>
                       <a:r>
-                        <a:t>Difference in Temperature</a:t>
-                      </a:r>
-                    </a:p>
-                  </a:txBody>
-                  <a:tcPr/>
-                </a:tc>
-                <a:tc>
-                  <a:txBody>
-                    <a:bodyPr/>
-                    <a:lstStyle/>
-                    <a:p>
-                      <a:r>
-                        <a:t>nan</a:t>
+                        <a:t>Maximum Fet Temperature-BMS(C)</a:t>
+                      </a:r>
+                    </a:p>
+                  </a:txBody>
+                  <a:tcPr/>
+                </a:tc>
+                <a:tc>
+                  <a:txBody>
+                    <a:bodyPr/>
+                    <a:lstStyle/>
+                    <a:p>
+                      <a:r>
+                        <a:t>62.0</a:t>
                       </a:r>
                     </a:p>
                   </a:txBody>
@@ -3896,19 +3948,19 @@
                     <a:lstStyle/>
                     <a:p>
                       <a:r>
-                        <a:t>Maximum Fet Temperature</a:t>
-                      </a:r>
-                    </a:p>
-                  </a:txBody>
-                  <a:tcPr/>
-                </a:tc>
-                <a:tc>
-                  <a:txBody>
-                    <a:bodyPr/>
-                    <a:lstStyle/>
-                    <a:p>
-                      <a:r>
-                        <a:t>62.0</a:t>
+                        <a:t>Maximum Afe Temperature-BMS(C)</a:t>
+                      </a:r>
+                    </a:p>
+                  </a:txBody>
+                  <a:tcPr/>
+                </a:tc>
+                <a:tc>
+                  <a:txBody>
+                    <a:bodyPr/>
+                    <a:lstStyle/>
+                    <a:p>
+                      <a:r>
+                        <a:t>60.0</a:t>
                       </a:r>
                     </a:p>
                   </a:txBody>
@@ -3922,33 +3974,7 @@
                     <a:lstStyle/>
                     <a:p>
                       <a:r>
-                        <a:t>Maximum Afe Temperature</a:t>
-                      </a:r>
-                    </a:p>
-                  </a:txBody>
-                  <a:tcPr/>
-                </a:tc>
-                <a:tc>
-                  <a:txBody>
-                    <a:bodyPr/>
-                    <a:lstStyle/>
-                    <a:p>
-                      <a:r>
-                        <a:t>60.0</a:t>
-                      </a:r>
-                    </a:p>
-                  </a:txBody>
-                  <a:tcPr/>
-                </a:tc>
-              </a:tr>
-              <a:tr h="326571">
-                <a:tc>
-                  <a:txBody>
-                    <a:bodyPr/>
-                    <a:lstStyle/>
-                    <a:p>
-                      <a:r>
-                        <a:t>Maximum PCB Temperature</a:t>
+                        <a:t>Maximum PCB Temperature-BMS(C)</a:t>
                       </a:r>
                     </a:p>
                   </a:txBody>
@@ -3967,14 +3993,14 @@
                   <a:tcPr/>
                 </a:tc>
               </a:tr>
-              <a:tr h="326571">
-                <a:tc>
-                  <a:txBody>
-                    <a:bodyPr/>
-                    <a:lstStyle/>
-                    <a:p>
-                      <a:r>
-                        <a:t>Maximum MCU Temperature</a:t>
+              <a:tr h="326577">
+                <a:tc>
+                  <a:txBody>
+                    <a:bodyPr/>
+                    <a:lstStyle/>
+                    <a:p>
+                      <a:r>
+                        <a:t>Maximum MCU Temperature(C)</a:t>
                       </a:r>
                     </a:p>
                   </a:txBody>
@@ -3987,32 +4013,6 @@
                     <a:p>
                       <a:r>
                         <a:t>66.0</a:t>
-                      </a:r>
-                    </a:p>
-                  </a:txBody>
-                  <a:tcPr/>
-                </a:tc>
-              </a:tr>
-              <a:tr h="326577">
-                <a:tc>
-                  <a:txBody>
-                    <a:bodyPr/>
-                    <a:lstStyle/>
-                    <a:p>
-                      <a:r>
-                        <a:t>Maximum Motor Temperature</a:t>
-                      </a:r>
-                    </a:p>
-                  </a:txBody>
-                  <a:tcPr/>
-                </a:tc>
-                <a:tc>
-                  <a:txBody>
-                    <a:bodyPr/>
-                    <a:lstStyle/>
-                    <a:p>
-                      <a:r>
-                        <a:t>102.0</a:t>
                       </a:r>
                     </a:p>
                   </a:txBody>
@@ -4117,7 +4117,33 @@
                     <a:lstStyle/>
                     <a:p>
                       <a:r>
-                        <a:t>Abnormal Motor Temperature Detected</a:t>
+                        <a:t>Maximum Motor Temperature(C)</a:t>
+                      </a:r>
+                    </a:p>
+                  </a:txBody>
+                  <a:tcPr/>
+                </a:tc>
+                <a:tc>
+                  <a:txBody>
+                    <a:bodyPr/>
+                    <a:lstStyle/>
+                    <a:p>
+                      <a:r>
+                        <a:t>102.0</a:t>
+                      </a:r>
+                    </a:p>
+                  </a:txBody>
+                  <a:tcPr/>
+                </a:tc>
+              </a:tr>
+              <a:tr h="326571">
+                <a:tc>
+                  <a:txBody>
+                    <a:bodyPr/>
+                    <a:lstStyle/>
+                    <a:p>
+                      <a:r>
+                        <a:t>Abnormal Motor Temperature Detected(C)</a:t>
                       </a:r>
                     </a:p>
                   </a:txBody>
@@ -4143,7 +4169,7 @@
                     <a:lstStyle/>
                     <a:p>
                       <a:r>
-                        <a:t>lowest cell temp</a:t>
+                        <a:t>highest cell temp(C)</a:t>
                       </a:r>
                     </a:p>
                   </a:txBody>
@@ -4169,7 +4195,7 @@
                     <a:lstStyle/>
                     <a:p>
                       <a:r>
-                        <a:t>highest cell temp</a:t>
+                        <a:t>lowest cell temp(C)</a:t>
                       </a:r>
                     </a:p>
                   </a:txBody>
@@ -4195,7 +4221,7 @@
                     <a:lstStyle/>
                     <a:p>
                       <a:r>
-                        <a:t>Difference between Highest and Lowest Cell Temperature at 100% SOC</a:t>
+                        <a:t>Difference between Highest and Lowest Cell Temperature at 100% SOC(C)</a:t>
                       </a:r>
                     </a:p>
                   </a:txBody>
@@ -4221,19 +4247,19 @@
                     <a:lstStyle/>
                     <a:p>
                       <a:r>
-                        <a:t>Maximum BMS Temperature in C</a:t>
-                      </a:r>
-                    </a:p>
-                  </a:txBody>
-                  <a:tcPr/>
-                </a:tc>
-                <a:tc>
-                  <a:txBody>
-                    <a:bodyPr/>
-                    <a:lstStyle/>
-                    <a:p>
-                      <a:r>
-                        <a:t>62.0</a:t>
+                        <a:t>Battery Voltage(V)</a:t>
+                      </a:r>
+                    </a:p>
+                  </a:txBody>
+                  <a:tcPr/>
+                </a:tc>
+                <a:tc>
+                  <a:txBody>
+                    <a:bodyPr/>
+                    <a:lstStyle/>
+                    <a:p>
+                      <a:r>
+                        <a:t>53.0</a:t>
                       </a:r>
                     </a:p>
                   </a:txBody>
@@ -4247,19 +4273,19 @@
                     <a:lstStyle/>
                     <a:p>
                       <a:r>
-                        <a:t>Battery Voltage</a:t>
-                      </a:r>
-                    </a:p>
-                  </a:txBody>
-                  <a:tcPr/>
-                </a:tc>
-                <a:tc>
-                  <a:txBody>
-                    <a:bodyPr/>
-                    <a:lstStyle/>
-                    <a:p>
-                      <a:r>
-                        <a:t>5.3</a:t>
+                        <a:t>Total energy charged(kWh)</a:t>
+                      </a:r>
+                    </a:p>
+                  </a:txBody>
+                  <a:tcPr/>
+                </a:tc>
+                <a:tc>
+                  <a:txBody>
+                    <a:bodyPr/>
+                    <a:lstStyle/>
+                    <a:p>
+                      <a:r>
+                        <a:t>1.5767609680555554</a:t>
                       </a:r>
                     </a:p>
                   </a:txBody>
@@ -4273,19 +4299,19 @@
                     <a:lstStyle/>
                     <a:p>
                       <a:r>
-                        <a:t>Total energy charged in kWh</a:t>
-                      </a:r>
-                    </a:p>
-                  </a:txBody>
-                  <a:tcPr/>
-                </a:tc>
-                <a:tc>
-                  <a:txBody>
-                    <a:bodyPr/>
-                    <a:lstStyle/>
-                    <a:p>
-                      <a:r>
-                        <a:t>0.15767609680555555</a:t>
+                        <a:t>Electricity consumption units(kW)</a:t>
+                      </a:r>
+                    </a:p>
+                  </a:txBody>
+                  <a:tcPr/>
+                </a:tc>
+                <a:tc>
+                  <a:txBody>
+                    <a:bodyPr/>
+                    <a:lstStyle/>
+                    <a:p>
+                      <a:r>
+                        <a:t>1.6447208328697328e-07</a:t>
                       </a:r>
                     </a:p>
                   </a:txBody>
@@ -4299,19 +4325,19 @@
                     <a:lstStyle/>
                     <a:p>
                       <a:r>
-                        <a:t>Electricity consumption units in kW</a:t>
-                      </a:r>
-                    </a:p>
-                  </a:txBody>
-                  <a:tcPr/>
-                </a:tc>
-                <a:tc>
-                  <a:txBody>
-                    <a:bodyPr/>
-                    <a:lstStyle/>
-                    <a:p>
-                      <a:r>
-                        <a:t>1.6447208328697328e-08</a:t>
+                        <a:t>Cycle Count of battery</a:t>
+                      </a:r>
+                    </a:p>
+                  </a:txBody>
+                  <a:tcPr/>
+                </a:tc>
+                <a:tc>
+                  <a:txBody>
+                    <a:bodyPr/>
+                    <a:lstStyle/>
+                    <a:p>
+                      <a:r>
+                        <a:t>41.0</a:t>
                       </a:r>
                     </a:p>
                   </a:txBody>
@@ -4337,7 +4363,7 @@
                     <a:lstStyle/>
                     <a:p>
                       <a:r>
-                        <a:t>6.458357991083758</a:t>
+                        <a:t>7.641930011441196</a:t>
                       </a:r>
                     </a:p>
                   </a:txBody>
@@ -4363,7 +4389,7 @@
                     <a:lstStyle/>
                     <a:p>
                       <a:r>
-                        <a:t>16.952696571586383</a:t>
+                        <a:t>10.494338580502625</a:t>
                       </a:r>
                     </a:p>
                   </a:txBody>
@@ -4389,14 +4415,14 @@
                     <a:lstStyle/>
                     <a:p>
                       <a:r>
-                        <a:t>5.3694717323549135</a:t>
-                      </a:r>
-                    </a:p>
-                  </a:txBody>
-                  <a:tcPr/>
-                </a:tc>
-              </a:tr>
-              <a:tr h="326571">
+                        <a:t>5.353690772083481</a:t>
+                      </a:r>
+                    </a:p>
+                  </a:txBody>
+                  <a:tcPr/>
+                </a:tc>
+              </a:tr>
+              <a:tr h="326577">
                 <a:tc>
                   <a:txBody>
                     <a:bodyPr/>
@@ -4415,33 +4441,7 @@
                     <a:lstStyle/>
                     <a:p>
                       <a:r>
-                        <a:t>8.675582909220026</a:t>
-                      </a:r>
-                    </a:p>
-                  </a:txBody>
-                  <a:tcPr/>
-                </a:tc>
-              </a:tr>
-              <a:tr h="326577">
-                <a:tc>
-                  <a:txBody>
-                    <a:bodyPr/>
-                    <a:lstStyle/>
-                    <a:p>
-                      <a:r>
-                        <a:t>Time spent in 30-40 km/h</a:t>
-                      </a:r>
-                    </a:p>
-                  </a:txBody>
-                  <a:tcPr/>
-                </a:tc>
-                <a:tc>
-                  <a:txBody>
-                    <a:bodyPr/>
-                    <a:lstStyle/>
-                    <a:p>
-                      <a:r>
-                        <a:t>13.358582869767623</a:t>
+                        <a:t>8.663747189016451</a:t>
                       </a:r>
                     </a:p>
                   </a:txBody>
@@ -4546,6 +4546,32 @@
                     <a:lstStyle/>
                     <a:p>
                       <a:r>
+                        <a:t>Time spent in 30-40 km/h</a:t>
+                      </a:r>
+                    </a:p>
+                  </a:txBody>
+                  <a:tcPr/>
+                </a:tc>
+                <a:tc>
+                  <a:txBody>
+                    <a:bodyPr/>
+                    <a:lstStyle/>
+                    <a:p>
+                      <a:r>
+                        <a:t>13.34674714956405</a:t>
+                      </a:r>
+                    </a:p>
+                  </a:txBody>
+                  <a:tcPr/>
+                </a:tc>
+              </a:tr>
+              <a:tr h="326571">
+                <a:tc>
+                  <a:txBody>
+                    <a:bodyPr/>
+                    <a:lstStyle/>
+                    <a:p>
+                      <a:r>
                         <a:t>Time spent in 40-50 km/h</a:t>
                       </a:r>
                     </a:p>
@@ -4558,7 +4584,7 @@
                     <a:lstStyle/>
                     <a:p>
                       <a:r>
-                        <a:t>12.277587091174498</a:t>
+                        <a:t>12.246025170631633</a:t>
                       </a:r>
                     </a:p>
                   </a:txBody>
@@ -4584,7 +4610,7 @@
                     <a:lstStyle/>
                     <a:p>
                       <a:r>
-                        <a:t>12.65633013768888</a:t>
+                        <a:t>12.636603937349589</a:t>
                       </a:r>
                     </a:p>
                   </a:txBody>
@@ -4610,7 +4636,7 @@
                     <a:lstStyle/>
                     <a:p>
                       <a:r>
-                        <a:t>19.78143370024066</a:t>
+                        <a:t>19.765652739969227</a:t>
                       </a:r>
                     </a:p>
                   </a:txBody>
@@ -4622,15 +4648,23 @@
                   <a:txBody>
                     <a:bodyPr/>
                     <a:lstStyle/>
-                    <a:p/>
-                  </a:txBody>
-                  <a:tcPr/>
-                </a:tc>
-                <a:tc>
-                  <a:txBody>
-                    <a:bodyPr/>
-                    <a:lstStyle/>
-                    <a:p/>
+                    <a:p>
+                      <a:r>
+                        <a:t>Time spent in 70-80 km/h</a:t>
+                      </a:r>
+                    </a:p>
+                  </a:txBody>
+                  <a:tcPr/>
+                </a:tc>
+                <a:tc>
+                  <a:txBody>
+                    <a:bodyPr/>
+                    <a:lstStyle/>
+                    <a:p>
+                      <a:r>
+                        <a:t>9.69740008679528</a:t>
+                      </a:r>
+                    </a:p>
                   </a:txBody>
                   <a:tcPr/>
                 </a:tc>
@@ -4640,33 +4674,23 @@
                   <a:txBody>
                     <a:bodyPr/>
                     <a:lstStyle/>
-                    <a:p/>
-                  </a:txBody>
-                  <a:tcPr/>
-                </a:tc>
-                <a:tc>
-                  <a:txBody>
-                    <a:bodyPr/>
-                    <a:lstStyle/>
-                    <a:p/>
-                  </a:txBody>
-                  <a:tcPr/>
-                </a:tc>
-              </a:tr>
-              <a:tr h="326571">
-                <a:tc>
-                  <a:txBody>
-                    <a:bodyPr/>
-                    <a:lstStyle/>
-                    <a:p/>
-                  </a:txBody>
-                  <a:tcPr/>
-                </a:tc>
-                <a:tc>
-                  <a:txBody>
-                    <a:bodyPr/>
-                    <a:lstStyle/>
-                    <a:p/>
+                    <a:p>
+                      <a:r>
+                        <a:t>Time spent in 80-90 km/h</a:t>
+                      </a:r>
+                    </a:p>
+                  </a:txBody>
+                  <a:tcPr/>
+                </a:tc>
+                <a:tc>
+                  <a:txBody>
+                    <a:bodyPr/>
+                    <a:lstStyle/>
+                    <a:p>
+                      <a:r>
+                        <a:t>0.0</a:t>
+                      </a:r>
+                    </a:p>
                   </a:txBody>
                   <a:tcPr/>
                 </a:tc>

</xml_diff>